<commit_message>
Added presentation, readme addition and fixes
</commit_message>
<xml_diff>
--- a/powerpoint/presentation.pptx
+++ b/powerpoint/presentation.pptx
@@ -29,9 +29,16 @@
       <p:bold r:id="rId18"/>
     </p:embeddedFont>
     <p:embeddedFont>
-      <p:font typeface="Oswald"/>
+      <p:font typeface="Roboto"/>
       <p:regular r:id="rId19"/>
       <p:bold r:id="rId20"/>
+      <p:italic r:id="rId21"/>
+      <p:boldItalic r:id="rId22"/>
+    </p:embeddedFont>
+    <p:embeddedFont>
+      <p:font typeface="Oswald"/>
+      <p:regular r:id="rId23"/>
+      <p:bold r:id="rId24"/>
     </p:embeddedFont>
   </p:embeddedFontLst>
   <p:defaultTextStyle>
@@ -827,7 +834,7 @@
   <p:cSld>
     <p:spTree>
       <p:nvGrpSpPr>
-        <p:cNvPr id="159" name="Shape 159"/>
+        <p:cNvPr id="158" name="Shape 158"/>
         <p:cNvGrpSpPr/>
         <p:nvPr/>
       </p:nvGrpSpPr>
@@ -841,7 +848,7 @@
       </p:grpSpPr>
       <p:sp>
         <p:nvSpPr>
-          <p:cNvPr id="160" name="Google Shape;160;g208c486f15f_0_83:notes"/>
+          <p:cNvPr id="159" name="Google Shape;159;g208c486f15f_0_83:notes"/>
           <p:cNvSpPr txBox="1"/>
           <p:nvPr>
             <p:ph idx="1" type="body"/>
@@ -880,7 +887,7 @@
       </p:sp>
       <p:sp>
         <p:nvSpPr>
-          <p:cNvPr id="161" name="Google Shape;161;g208c486f15f_0_83:notes"/>
+          <p:cNvPr id="160" name="Google Shape;160;g208c486f15f_0_83:notes"/>
           <p:cNvSpPr/>
           <p:nvPr>
             <p:ph idx="2" type="sldImg"/>
@@ -926,7 +933,7 @@
   <p:cSld>
     <p:spTree>
       <p:nvGrpSpPr>
-        <p:cNvPr id="175" name="Shape 175"/>
+        <p:cNvPr id="171" name="Shape 171"/>
         <p:cNvGrpSpPr/>
         <p:nvPr/>
       </p:nvGrpSpPr>
@@ -940,7 +947,7 @@
       </p:grpSpPr>
       <p:sp>
         <p:nvSpPr>
-          <p:cNvPr id="176" name="Google Shape;176;g208c486f15f_0_101:notes"/>
+          <p:cNvPr id="172" name="Google Shape;172;g208c486f15f_0_101:notes"/>
           <p:cNvSpPr txBox="1"/>
           <p:nvPr>
             <p:ph idx="1" type="body"/>
@@ -979,7 +986,7 @@
       </p:sp>
       <p:sp>
         <p:nvSpPr>
-          <p:cNvPr id="177" name="Google Shape;177;g208c486f15f_0_101:notes"/>
+          <p:cNvPr id="173" name="Google Shape;173;g208c486f15f_0_101:notes"/>
           <p:cNvSpPr/>
           <p:nvPr>
             <p:ph idx="2" type="sldImg"/>
@@ -1718,7 +1725,7 @@
   <p:cSld>
     <p:spTree>
       <p:nvGrpSpPr>
-        <p:cNvPr id="148" name="Shape 148"/>
+        <p:cNvPr id="147" name="Shape 147"/>
         <p:cNvGrpSpPr/>
         <p:nvPr/>
       </p:nvGrpSpPr>
@@ -1732,7 +1739,7 @@
       </p:grpSpPr>
       <p:sp>
         <p:nvSpPr>
-          <p:cNvPr id="149" name="Google Shape;149;g208c486f15f_0_67:notes"/>
+          <p:cNvPr id="148" name="Google Shape;148;g208c486f15f_0_67:notes"/>
           <p:cNvSpPr txBox="1"/>
           <p:nvPr>
             <p:ph idx="1" type="body"/>
@@ -1771,7 +1778,7 @@
       </p:sp>
       <p:sp>
         <p:nvSpPr>
-          <p:cNvPr id="150" name="Google Shape;150;g208c486f15f_0_67:notes"/>
+          <p:cNvPr id="149" name="Google Shape;149;g208c486f15f_0_67:notes"/>
           <p:cNvSpPr/>
           <p:nvPr>
             <p:ph idx="2" type="sldImg"/>
@@ -10507,7 +10514,7 @@
   <p:cSld>
     <p:spTree>
       <p:nvGrpSpPr>
-        <p:cNvPr id="162" name="Shape 162"/>
+        <p:cNvPr id="161" name="Shape 161"/>
         <p:cNvGrpSpPr/>
         <p:nvPr/>
       </p:nvGrpSpPr>
@@ -10521,7 +10528,7 @@
       </p:grpSpPr>
       <p:sp>
         <p:nvSpPr>
-          <p:cNvPr id="163" name="Google Shape;163;p20"/>
+          <p:cNvPr id="162" name="Google Shape;162;p20"/>
           <p:cNvSpPr/>
           <p:nvPr/>
         </p:nvSpPr>
@@ -10572,93 +10579,7 @@
       </p:sp>
       <p:sp>
         <p:nvSpPr>
-          <p:cNvPr id="164" name="Google Shape;164;p20"/>
-          <p:cNvSpPr/>
-          <p:nvPr/>
-        </p:nvSpPr>
-        <p:spPr>
-          <a:xfrm>
-            <a:off x="2667215" y="3265606"/>
-            <a:ext cx="858900" cy="858900"/>
-          </a:xfrm>
-          <a:prstGeom prst="ellipse">
-            <a:avLst/>
-          </a:prstGeom>
-          <a:solidFill>
-            <a:srgbClr val="262626"/>
-          </a:solidFill>
-          <a:ln>
-            <a:noFill/>
-          </a:ln>
-        </p:spPr>
-        <p:txBody>
-          <a:bodyPr anchorCtr="0" anchor="ctr" bIns="45700" lIns="91425" spcFirstLastPara="1" rIns="91425" wrap="square" tIns="45700">
-            <a:noAutofit/>
-          </a:bodyPr>
-          <a:lstStyle/>
-          <a:p>
-            <a:pPr indent="0" lvl="0" marL="0" marR="0" rtl="0" algn="ctr">
-              <a:spcBef>
-                <a:spcPts val="0"/>
-              </a:spcBef>
-              <a:spcAft>
-                <a:spcPts val="0"/>
-              </a:spcAft>
-              <a:buNone/>
-            </a:pPr>
-            <a:r>
-              <a:rPr lang="es-ES" sz="2400">
-                <a:solidFill>
-                  <a:schemeClr val="lt1"/>
-                </a:solidFill>
-                <a:latin typeface="Oswald"/>
-                <a:ea typeface="Oswald"/>
-                <a:cs typeface="Oswald"/>
-                <a:sym typeface="Oswald"/>
-              </a:rPr>
-              <a:t>01</a:t>
-            </a:r>
-            <a:endParaRPr sz="1800">
-              <a:solidFill>
-                <a:schemeClr val="lt1"/>
-              </a:solidFill>
-              <a:latin typeface="Oswald"/>
-              <a:ea typeface="Oswald"/>
-              <a:cs typeface="Oswald"/>
-              <a:sym typeface="Oswald"/>
-            </a:endParaRPr>
-          </a:p>
-        </p:txBody>
-      </p:sp>
-      <p:cxnSp>
-        <p:nvCxnSpPr>
-          <p:cNvPr id="165" name="Google Shape;165;p20"/>
-          <p:cNvCxnSpPr/>
-          <p:nvPr/>
-        </p:nvCxnSpPr>
-        <p:spPr>
-          <a:xfrm>
-            <a:off x="3102931" y="3978778"/>
-            <a:ext cx="0" cy="604800"/>
-          </a:xfrm>
-          <a:prstGeom prst="straightConnector1">
-            <a:avLst/>
-          </a:prstGeom>
-          <a:noFill/>
-          <a:ln cap="flat" cmpd="sng" w="25400">
-            <a:solidFill>
-              <a:schemeClr val="accent1"/>
-            </a:solidFill>
-            <a:prstDash val="solid"/>
-            <a:miter lim="800000"/>
-            <a:headEnd len="sm" w="sm" type="none"/>
-            <a:tailEnd len="sm" w="sm" type="none"/>
-          </a:ln>
-        </p:spPr>
-      </p:cxnSp>
-      <p:sp>
-        <p:nvSpPr>
-          <p:cNvPr id="166" name="Google Shape;166;p20"/>
+          <p:cNvPr id="163" name="Google Shape;163;p20"/>
           <p:cNvSpPr txBox="1"/>
           <p:nvPr>
             <p:ph idx="1" type="body"/>
@@ -10708,7 +10629,7 @@
       </p:sp>
       <p:sp>
         <p:nvSpPr>
-          <p:cNvPr id="167" name="Google Shape;167;p20"/>
+          <p:cNvPr id="164" name="Google Shape;164;p20"/>
           <p:cNvSpPr txBox="1"/>
           <p:nvPr/>
         </p:nvSpPr>
@@ -10762,14 +10683,14 @@
       </p:sp>
       <p:sp>
         <p:nvSpPr>
-          <p:cNvPr id="168" name="Google Shape;168;p20"/>
+          <p:cNvPr id="165" name="Google Shape;165;p20"/>
           <p:cNvSpPr txBox="1"/>
           <p:nvPr/>
         </p:nvSpPr>
         <p:spPr>
           <a:xfrm>
-            <a:off x="2110065" y="4721183"/>
-            <a:ext cx="1973400" cy="1091100"/>
+            <a:off x="2392950" y="2905650"/>
+            <a:ext cx="3000000" cy="1046700"/>
           </a:xfrm>
           <a:prstGeom prst="rect">
             <a:avLst/>
@@ -10780,15 +10701,12 @@
           </a:ln>
         </p:spPr>
         <p:txBody>
-          <a:bodyPr anchorCtr="0" anchor="ctr" bIns="45700" lIns="91425" spcFirstLastPara="1" rIns="91425" wrap="square" tIns="45700">
-            <a:noAutofit/>
+          <a:bodyPr anchorCtr="0" anchor="t" bIns="91425" lIns="91425" spcFirstLastPara="1" rIns="91425" wrap="square" tIns="91425">
+            <a:spAutoFit/>
           </a:bodyPr>
           <a:lstStyle/>
           <a:p>
-            <a:pPr indent="0" lvl="0" marL="0" marR="0" rtl="0" algn="ctr">
-              <a:lnSpc>
-                <a:spcPct val="166250"/>
-              </a:lnSpc>
+            <a:pPr indent="0" lvl="0" marL="0" rtl="0" algn="ctr">
               <a:spcBef>
                 <a:spcPts val="0"/>
               </a:spcBef>
@@ -10798,35 +10716,27 @@
               <a:buNone/>
             </a:pPr>
             <a:r>
-              <a:rPr lang="es-ES" sz="1600">
-                <a:solidFill>
-                  <a:schemeClr val="dk1"/>
+              <a:rPr b="1" lang="es-ES" sz="2800">
+                <a:solidFill>
+                  <a:srgbClr val="0C0C0C"/>
                 </a:solidFill>
               </a:rPr>
-              <a:t>Black box testing on the breadboard</a:t>
+              <a:t>Hardware Testing</a:t>
             </a:r>
-            <a:endParaRPr sz="1600">
-              <a:solidFill>
-                <a:schemeClr val="dk1"/>
-              </a:solidFill>
-              <a:latin typeface="Arial"/>
-              <a:ea typeface="Arial"/>
-              <a:cs typeface="Arial"/>
-              <a:sym typeface="Arial"/>
-            </a:endParaRPr>
+            <a:endParaRPr sz="100"/>
           </a:p>
         </p:txBody>
       </p:sp>
       <p:sp>
         <p:nvSpPr>
-          <p:cNvPr id="169" name="Google Shape;169;p20"/>
+          <p:cNvPr id="166" name="Google Shape;166;p20"/>
           <p:cNvSpPr txBox="1"/>
           <p:nvPr/>
         </p:nvSpPr>
         <p:spPr>
           <a:xfrm>
-            <a:off x="5185493" y="4721184"/>
-            <a:ext cx="1973400" cy="1091100"/>
+            <a:off x="6711450" y="2905650"/>
+            <a:ext cx="3000000" cy="1046700"/>
           </a:xfrm>
           <a:prstGeom prst="rect">
             <a:avLst/>
@@ -10837,15 +10747,12 @@
           </a:ln>
         </p:spPr>
         <p:txBody>
-          <a:bodyPr anchorCtr="0" anchor="ctr" bIns="45700" lIns="91425" spcFirstLastPara="1" rIns="91425" wrap="square" tIns="45700">
-            <a:noAutofit/>
+          <a:bodyPr anchorCtr="0" anchor="t" bIns="91425" lIns="91425" spcFirstLastPara="1" rIns="91425" wrap="square" tIns="91425">
+            <a:spAutoFit/>
           </a:bodyPr>
           <a:lstStyle/>
           <a:p>
-            <a:pPr indent="0" lvl="0" marL="0" marR="0" rtl="0" algn="ctr">
-              <a:lnSpc>
-                <a:spcPct val="166250"/>
-              </a:lnSpc>
+            <a:pPr indent="0" lvl="0" marL="0" rtl="0" algn="ctr">
               <a:spcBef>
                 <a:spcPts val="0"/>
               </a:spcBef>
@@ -10855,20 +10762,36 @@
               <a:buNone/>
             </a:pPr>
             <a:r>
-              <a:rPr lang="es-ES" sz="1600">
-                <a:solidFill>
-                  <a:schemeClr val="dk1"/>
+              <a:rPr b="1" lang="es-ES" sz="2800">
+                <a:solidFill>
+                  <a:srgbClr val="0C0C0C"/>
                 </a:solidFill>
               </a:rPr>
-              <a:t>White </a:t>
+              <a:t>Software</a:t>
             </a:r>
+            <a:endParaRPr b="1" sz="2800">
+              <a:solidFill>
+                <a:srgbClr val="0C0C0C"/>
+              </a:solidFill>
+            </a:endParaRPr>
+          </a:p>
+          <a:p>
+            <a:pPr indent="0" lvl="0" marL="0" rtl="0" algn="ctr">
+              <a:spcBef>
+                <a:spcPts val="0"/>
+              </a:spcBef>
+              <a:spcAft>
+                <a:spcPts val="0"/>
+              </a:spcAft>
+              <a:buNone/>
+            </a:pPr>
             <a:r>
-              <a:rPr lang="es-ES" sz="1600">
-                <a:solidFill>
-                  <a:schemeClr val="dk1"/>
+              <a:rPr b="1" lang="es-ES" sz="2800">
+                <a:solidFill>
+                  <a:srgbClr val="0C0C0C"/>
                 </a:solidFill>
               </a:rPr>
-              <a:t>box testing on functions and loops</a:t>
+              <a:t>Testing</a:t>
             </a:r>
             <a:endParaRPr/>
           </a:p>
@@ -10876,14 +10799,14 @@
       </p:sp>
       <p:sp>
         <p:nvSpPr>
-          <p:cNvPr id="170" name="Google Shape;170;p20"/>
+          <p:cNvPr id="167" name="Google Shape;167;p20"/>
           <p:cNvSpPr txBox="1"/>
           <p:nvPr/>
         </p:nvSpPr>
         <p:spPr>
           <a:xfrm>
-            <a:off x="7912016" y="4721183"/>
-            <a:ext cx="2322300" cy="1091100"/>
+            <a:off x="2341850" y="4440000"/>
+            <a:ext cx="3000000" cy="785100"/>
           </a:xfrm>
           <a:prstGeom prst="rect">
             <a:avLst/>
@@ -10894,215 +10817,312 @@
           </a:ln>
         </p:spPr>
         <p:txBody>
-          <a:bodyPr anchorCtr="0" anchor="ctr" bIns="45700" lIns="91425" spcFirstLastPara="1" rIns="91425" wrap="square" tIns="45700">
-            <a:noAutofit/>
+          <a:bodyPr anchorCtr="0" anchor="t" bIns="91425" lIns="91425" spcFirstLastPara="1" rIns="91425" wrap="square" tIns="91425">
+            <a:spAutoFit/>
           </a:bodyPr>
           <a:lstStyle/>
           <a:p>
-            <a:pPr indent="0" lvl="0" marL="0" marR="0" rtl="0" algn="ctr">
-              <a:lnSpc>
-                <a:spcPct val="166250"/>
-              </a:lnSpc>
-              <a:spcBef>
-                <a:spcPts val="0"/>
-              </a:spcBef>
-              <a:spcAft>
-                <a:spcPts val="0"/>
-              </a:spcAft>
-              <a:buNone/>
+            <a:pPr indent="-311150" lvl="0" marL="457200" rtl="0" algn="l">
+              <a:spcBef>
+                <a:spcPts val="0"/>
+              </a:spcBef>
+              <a:spcAft>
+                <a:spcPts val="0"/>
+              </a:spcAft>
+              <a:buSzPts val="1300"/>
+              <a:buChar char="-"/>
             </a:pPr>
             <a:r>
-              <a:rPr lang="es-ES" sz="1600">
-                <a:solidFill>
-                  <a:schemeClr val="dk1"/>
+              <a:rPr lang="es-ES" sz="1300">
+                <a:solidFill>
+                  <a:srgbClr val="0C0C0C"/>
                 </a:solidFill>
               </a:rPr>
-              <a:t>Test on the field for the IR data transmission</a:t>
+              <a:t>Multimeter</a:t>
             </a:r>
-            <a:endParaRPr sz="1600">
+            <a:endParaRPr sz="1300">
               <a:solidFill>
-                <a:schemeClr val="dk1"/>
+                <a:srgbClr val="0C0C0C"/>
               </a:solidFill>
-              <a:latin typeface="Arial"/>
-              <a:ea typeface="Arial"/>
-              <a:cs typeface="Arial"/>
-              <a:sym typeface="Arial"/>
+            </a:endParaRPr>
+          </a:p>
+          <a:p>
+            <a:pPr indent="-311150" lvl="0" marL="457200" rtl="0" algn="l">
+              <a:spcBef>
+                <a:spcPts val="0"/>
+              </a:spcBef>
+              <a:spcAft>
+                <a:spcPts val="0"/>
+              </a:spcAft>
+              <a:buClr>
+                <a:srgbClr val="0C0C0C"/>
+              </a:buClr>
+              <a:buSzPts val="1300"/>
+              <a:buChar char="-"/>
+            </a:pPr>
+            <a:r>
+              <a:rPr lang="es-ES" sz="1300">
+                <a:solidFill>
+                  <a:srgbClr val="0C0C0C"/>
+                </a:solidFill>
+              </a:rPr>
+              <a:t>IR field of view testing</a:t>
+            </a:r>
+            <a:endParaRPr sz="1300">
+              <a:solidFill>
+                <a:srgbClr val="0C0C0C"/>
+              </a:solidFill>
+            </a:endParaRPr>
+          </a:p>
+          <a:p>
+            <a:pPr indent="-311150" lvl="0" marL="457200" rtl="0" algn="l">
+              <a:spcBef>
+                <a:spcPts val="0"/>
+              </a:spcBef>
+              <a:spcAft>
+                <a:spcPts val="0"/>
+              </a:spcAft>
+              <a:buClr>
+                <a:srgbClr val="0C0C0C"/>
+              </a:buClr>
+              <a:buSzPts val="1300"/>
+              <a:buChar char="-"/>
+            </a:pPr>
+            <a:r>
+              <a:rPr lang="es-ES" sz="1300">
+                <a:solidFill>
+                  <a:srgbClr val="0C0C0C"/>
+                </a:solidFill>
+              </a:rPr>
+              <a:t>Reflection tests</a:t>
+            </a:r>
+            <a:endParaRPr sz="1300">
+              <a:solidFill>
+                <a:srgbClr val="0C0C0C"/>
+              </a:solidFill>
             </a:endParaRPr>
           </a:p>
         </p:txBody>
       </p:sp>
       <p:sp>
         <p:nvSpPr>
-          <p:cNvPr id="171" name="Google Shape;171;p20"/>
-          <p:cNvSpPr/>
+          <p:cNvPr id="168" name="Google Shape;168;p20"/>
+          <p:cNvSpPr txBox="1"/>
           <p:nvPr/>
         </p:nvSpPr>
         <p:spPr>
           <a:xfrm>
-            <a:off x="5696421" y="3265606"/>
-            <a:ext cx="858900" cy="858900"/>
+            <a:off x="6711450" y="4403500"/>
+            <a:ext cx="3000000" cy="1585500"/>
           </a:xfrm>
-          <a:prstGeom prst="ellipse">
+          <a:prstGeom prst="rect">
             <a:avLst/>
           </a:prstGeom>
-          <a:solidFill>
-            <a:srgbClr val="262626"/>
-          </a:solidFill>
+          <a:noFill/>
           <a:ln>
             <a:noFill/>
           </a:ln>
         </p:spPr>
         <p:txBody>
-          <a:bodyPr anchorCtr="0" anchor="ctr" bIns="45700" lIns="91425" spcFirstLastPara="1" rIns="91425" wrap="square" tIns="45700">
-            <a:noAutofit/>
+          <a:bodyPr anchorCtr="0" anchor="t" bIns="91425" lIns="91425" spcFirstLastPara="1" rIns="91425" wrap="square" tIns="91425">
+            <a:spAutoFit/>
           </a:bodyPr>
           <a:lstStyle/>
           <a:p>
-            <a:pPr indent="0" lvl="0" marL="0" marR="0" rtl="0" algn="ctr">
-              <a:spcBef>
-                <a:spcPts val="0"/>
-              </a:spcBef>
-              <a:spcAft>
-                <a:spcPts val="0"/>
-              </a:spcAft>
-              <a:buNone/>
+            <a:pPr indent="-311150" lvl="0" marL="457200" rtl="0" algn="l">
+              <a:spcBef>
+                <a:spcPts val="0"/>
+              </a:spcBef>
+              <a:spcAft>
+                <a:spcPts val="0"/>
+              </a:spcAft>
+              <a:buSzPts val="1300"/>
+              <a:buChar char="-"/>
             </a:pPr>
             <a:r>
-              <a:rPr lang="es-ES" sz="2400">
-                <a:solidFill>
-                  <a:schemeClr val="lt1"/>
-                </a:solidFill>
-                <a:latin typeface="Oswald"/>
-                <a:ea typeface="Oswald"/>
-                <a:cs typeface="Oswald"/>
-                <a:sym typeface="Oswald"/>
+              <a:rPr lang="es-ES" sz="1300">
+                <a:solidFill>
+                  <a:srgbClr val="0C0C0C"/>
+                </a:solidFill>
               </a:rPr>
-              <a:t>02</a:t>
+              <a:t>Protobuf decodes on serial</a:t>
             </a:r>
-            <a:endParaRPr sz="1800">
+            <a:endParaRPr sz="1300">
               <a:solidFill>
-                <a:schemeClr val="lt1"/>
+                <a:srgbClr val="0C0C0C"/>
               </a:solidFill>
-              <a:latin typeface="Oswald"/>
-              <a:ea typeface="Oswald"/>
-              <a:cs typeface="Oswald"/>
-              <a:sym typeface="Oswald"/>
+            </a:endParaRPr>
+          </a:p>
+          <a:p>
+            <a:pPr indent="-311150" lvl="0" marL="457200" rtl="0" algn="l">
+              <a:spcBef>
+                <a:spcPts val="0"/>
+              </a:spcBef>
+              <a:spcAft>
+                <a:spcPts val="0"/>
+              </a:spcAft>
+              <a:buClr>
+                <a:srgbClr val="0C0C0C"/>
+              </a:buClr>
+              <a:buSzPts val="1300"/>
+              <a:buChar char="-"/>
+            </a:pPr>
+            <a:r>
+              <a:rPr lang="es-ES" sz="1300">
+                <a:solidFill>
+                  <a:srgbClr val="0C0C0C"/>
+                </a:solidFill>
+              </a:rPr>
+              <a:t>Serial testing</a:t>
+            </a:r>
+            <a:endParaRPr sz="1300">
+              <a:solidFill>
+                <a:srgbClr val="0C0C0C"/>
+              </a:solidFill>
+            </a:endParaRPr>
+          </a:p>
+          <a:p>
+            <a:pPr indent="-311150" lvl="0" marL="457200" rtl="0" algn="l">
+              <a:spcBef>
+                <a:spcPts val="0"/>
+              </a:spcBef>
+              <a:spcAft>
+                <a:spcPts val="0"/>
+              </a:spcAft>
+              <a:buClr>
+                <a:srgbClr val="0C0C0C"/>
+              </a:buClr>
+              <a:buSzPts val="1300"/>
+              <a:buChar char="-"/>
+            </a:pPr>
+            <a:r>
+              <a:rPr lang="es-ES" sz="1300">
+                <a:solidFill>
+                  <a:srgbClr val="0C0C0C"/>
+                </a:solidFill>
+              </a:rPr>
+              <a:t>Time consume testing on functions</a:t>
+            </a:r>
+            <a:endParaRPr sz="1300">
+              <a:solidFill>
+                <a:srgbClr val="0C0C0C"/>
+              </a:solidFill>
+            </a:endParaRPr>
+          </a:p>
+          <a:p>
+            <a:pPr indent="-311150" lvl="0" marL="457200" rtl="0" algn="l">
+              <a:spcBef>
+                <a:spcPts val="0"/>
+              </a:spcBef>
+              <a:spcAft>
+                <a:spcPts val="0"/>
+              </a:spcAft>
+              <a:buClr>
+                <a:srgbClr val="0C0C0C"/>
+              </a:buClr>
+              <a:buSzPts val="1300"/>
+              <a:buChar char="-"/>
+            </a:pPr>
+            <a:r>
+              <a:rPr lang="es-ES" sz="1300">
+                <a:solidFill>
+                  <a:srgbClr val="0C0C0C"/>
+                </a:solidFill>
+              </a:rPr>
+              <a:t>IR decoding tests</a:t>
+            </a:r>
+            <a:endParaRPr sz="1300">
+              <a:solidFill>
+                <a:srgbClr val="0C0C0C"/>
+              </a:solidFill>
+            </a:endParaRPr>
+          </a:p>
+          <a:p>
+            <a:pPr indent="-311150" lvl="0" marL="457200" rtl="0" algn="l">
+              <a:spcBef>
+                <a:spcPts val="0"/>
+              </a:spcBef>
+              <a:spcAft>
+                <a:spcPts val="0"/>
+              </a:spcAft>
+              <a:buClr>
+                <a:srgbClr val="0C0C0C"/>
+              </a:buClr>
+              <a:buSzPts val="1300"/>
+              <a:buChar char="-"/>
+            </a:pPr>
+            <a:r>
+              <a:rPr lang="es-ES" sz="1300">
+                <a:solidFill>
+                  <a:srgbClr val="0C0C0C"/>
+                </a:solidFill>
+              </a:rPr>
+              <a:t>Backend connection and delays on reconnection</a:t>
+            </a:r>
+            <a:endParaRPr sz="1300">
+              <a:solidFill>
+                <a:srgbClr val="0C0C0C"/>
+              </a:solidFill>
             </a:endParaRPr>
           </a:p>
         </p:txBody>
       </p:sp>
-      <p:cxnSp>
-        <p:nvCxnSpPr>
-          <p:cNvPr id="172" name="Google Shape;172;p20"/>
-          <p:cNvCxnSpPr/>
+      <p:pic>
+        <p:nvPicPr>
+          <p:cNvPr id="169" name="Google Shape;169;p20"/>
+          <p:cNvPicPr preferRelativeResize="0"/>
           <p:nvPr/>
-        </p:nvCxnSpPr>
+        </p:nvPicPr>
+        <p:blipFill>
+          <a:blip r:embed="rId3">
+            <a:alphaModFix/>
+          </a:blip>
+          <a:stretch>
+            <a:fillRect/>
+          </a:stretch>
+        </p:blipFill>
         <p:spPr>
           <a:xfrm>
-            <a:off x="6132137" y="3978778"/>
-            <a:ext cx="0" cy="604800"/>
+            <a:off x="9405274" y="3678813"/>
+            <a:ext cx="2786725" cy="1159875"/>
           </a:xfrm>
-          <a:prstGeom prst="straightConnector1">
+          <a:prstGeom prst="rect">
             <a:avLst/>
           </a:prstGeom>
           <a:noFill/>
-          <a:ln cap="flat" cmpd="sng" w="25400">
-            <a:solidFill>
-              <a:schemeClr val="accent1"/>
-            </a:solidFill>
-            <a:prstDash val="solid"/>
-            <a:miter lim="800000"/>
-            <a:headEnd len="sm" w="sm" type="none"/>
-            <a:tailEnd len="sm" w="sm" type="none"/>
-          </a:ln>
-        </p:spPr>
-      </p:cxnSp>
-      <p:sp>
-        <p:nvSpPr>
-          <p:cNvPr id="173" name="Google Shape;173;p20"/>
-          <p:cNvSpPr/>
-          <p:nvPr/>
-        </p:nvSpPr>
-        <p:spPr>
-          <a:xfrm>
-            <a:off x="8643640" y="3265606"/>
-            <a:ext cx="858900" cy="858900"/>
-          </a:xfrm>
-          <a:prstGeom prst="ellipse">
-            <a:avLst/>
-          </a:prstGeom>
-          <a:solidFill>
-            <a:srgbClr val="262626"/>
-          </a:solidFill>
           <a:ln>
             <a:noFill/>
           </a:ln>
         </p:spPr>
-        <p:txBody>
-          <a:bodyPr anchorCtr="0" anchor="ctr" bIns="45700" lIns="91425" spcFirstLastPara="1" rIns="91425" wrap="square" tIns="45700">
-            <a:noAutofit/>
-          </a:bodyPr>
-          <a:lstStyle/>
-          <a:p>
-            <a:pPr indent="0" lvl="0" marL="0" marR="0" rtl="0" algn="ctr">
-              <a:spcBef>
-                <a:spcPts val="0"/>
-              </a:spcBef>
-              <a:spcAft>
-                <a:spcPts val="0"/>
-              </a:spcAft>
-              <a:buNone/>
-            </a:pPr>
-            <a:r>
-              <a:rPr lang="es-ES" sz="2400">
-                <a:solidFill>
-                  <a:schemeClr val="lt1"/>
-                </a:solidFill>
-                <a:latin typeface="Oswald"/>
-                <a:ea typeface="Oswald"/>
-                <a:cs typeface="Oswald"/>
-                <a:sym typeface="Oswald"/>
-              </a:rPr>
-              <a:t>03</a:t>
-            </a:r>
-            <a:endParaRPr sz="1800">
-              <a:solidFill>
-                <a:schemeClr val="lt1"/>
-              </a:solidFill>
-              <a:latin typeface="Oswald"/>
-              <a:ea typeface="Oswald"/>
-              <a:cs typeface="Oswald"/>
-              <a:sym typeface="Oswald"/>
-            </a:endParaRPr>
-          </a:p>
-        </p:txBody>
-      </p:sp>
-      <p:cxnSp>
-        <p:nvCxnSpPr>
-          <p:cNvPr id="174" name="Google Shape;174;p20"/>
-          <p:cNvCxnSpPr/>
+      </p:pic>
+      <p:pic>
+        <p:nvPicPr>
+          <p:cNvPr id="170" name="Google Shape;170;p20"/>
+          <p:cNvPicPr preferRelativeResize="0"/>
           <p:nvPr/>
-        </p:nvCxnSpPr>
+        </p:nvPicPr>
+        <p:blipFill>
+          <a:blip r:embed="rId4">
+            <a:alphaModFix/>
+          </a:blip>
+          <a:stretch>
+            <a:fillRect/>
+          </a:stretch>
+        </p:blipFill>
         <p:spPr>
           <a:xfrm>
-            <a:off x="9079356" y="3978778"/>
-            <a:ext cx="0" cy="604800"/>
+            <a:off x="756350" y="3253163"/>
+            <a:ext cx="1585500" cy="1585500"/>
           </a:xfrm>
-          <a:prstGeom prst="straightConnector1">
+          <a:prstGeom prst="rect">
             <a:avLst/>
           </a:prstGeom>
           <a:noFill/>
-          <a:ln cap="flat" cmpd="sng" w="25400">
-            <a:solidFill>
-              <a:schemeClr val="accent1"/>
-            </a:solidFill>
-            <a:prstDash val="solid"/>
-            <a:miter lim="800000"/>
-            <a:headEnd len="sm" w="sm" type="none"/>
-            <a:tailEnd len="sm" w="sm" type="none"/>
+          <a:ln>
+            <a:noFill/>
           </a:ln>
         </p:spPr>
-      </p:cxnSp>
+      </p:pic>
     </p:spTree>
   </p:cSld>
   <p:clrMapOvr>
@@ -11123,7 +11143,7 @@
     </p:bg>
     <p:spTree>
       <p:nvGrpSpPr>
-        <p:cNvPr id="178" name="Shape 178"/>
+        <p:cNvPr id="174" name="Shape 174"/>
         <p:cNvGrpSpPr/>
         <p:nvPr/>
       </p:nvGrpSpPr>
@@ -11137,7 +11157,7 @@
       </p:grpSpPr>
       <p:sp>
         <p:nvSpPr>
-          <p:cNvPr id="179" name="Google Shape;179;p21"/>
+          <p:cNvPr id="175" name="Google Shape;175;p21"/>
           <p:cNvSpPr txBox="1"/>
           <p:nvPr/>
         </p:nvSpPr>
@@ -11187,7 +11207,7 @@
       </p:sp>
       <p:sp>
         <p:nvSpPr>
-          <p:cNvPr id="180" name="Google Shape;180;p21"/>
+          <p:cNvPr id="176" name="Google Shape;176;p21"/>
           <p:cNvSpPr/>
           <p:nvPr/>
         </p:nvSpPr>
@@ -11236,7 +11256,7 @@
       </p:sp>
       <p:sp>
         <p:nvSpPr>
-          <p:cNvPr id="181" name="Google Shape;181;p21"/>
+          <p:cNvPr id="177" name="Google Shape;177;p21"/>
           <p:cNvSpPr txBox="1"/>
           <p:nvPr/>
         </p:nvSpPr>
@@ -11471,7 +11491,7 @@
       </p:sp>
       <p:cxnSp>
         <p:nvCxnSpPr>
-          <p:cNvPr id="182" name="Google Shape;182;p21"/>
+          <p:cNvPr id="178" name="Google Shape;178;p21"/>
           <p:cNvCxnSpPr/>
           <p:nvPr/>
         </p:nvCxnSpPr>
@@ -12529,7 +12549,7 @@
         </p:nvSpPr>
         <p:spPr>
           <a:xfrm>
-            <a:off x="3338533" y="767401"/>
+            <a:off x="3338533" y="758876"/>
             <a:ext cx="4956300" cy="923400"/>
           </a:xfrm>
           <a:prstGeom prst="rect">
@@ -12845,7 +12865,7 @@
                 <a:cs typeface="Oswald"/>
                 <a:sym typeface="Oswald"/>
               </a:rPr>
-              <a:t>Let’s see how the data flows in our system </a:t>
+              <a:t>Let’s see how data flows in our system </a:t>
             </a:r>
             <a:endParaRPr sz="1600">
               <a:latin typeface="Oswald"/>
@@ -13147,8 +13167,8 @@
         </p:blipFill>
         <p:spPr>
           <a:xfrm>
-            <a:off x="845675" y="2810099"/>
-            <a:ext cx="3802150" cy="1641200"/>
+            <a:off x="5720275" y="1773275"/>
+            <a:ext cx="4659026" cy="4140350"/>
           </a:xfrm>
           <a:prstGeom prst="rect">
             <a:avLst/>
@@ -13175,8 +13195,8 @@
         </p:blipFill>
         <p:spPr>
           <a:xfrm>
-            <a:off x="5720275" y="1773275"/>
-            <a:ext cx="4659026" cy="4140350"/>
+            <a:off x="1385463" y="2677687"/>
+            <a:ext cx="3515575" cy="1502625"/>
           </a:xfrm>
           <a:prstGeom prst="rect">
             <a:avLst/>
@@ -13550,7 +13570,7 @@
         </p:nvGrpSpPr>
         <p:grpSpPr>
           <a:xfrm>
-            <a:off x="1543950" y="3154800"/>
+            <a:off x="1561000" y="4260300"/>
             <a:ext cx="4158651" cy="1099100"/>
             <a:chOff x="1238275" y="1960375"/>
             <a:chExt cx="4158651" cy="1099100"/>
@@ -13776,62 +13796,6 @@
       <p:cxnSp>
         <p:nvCxnSpPr>
           <p:cNvPr id="145" name="Google Shape;145;p18"/>
-          <p:cNvCxnSpPr>
-            <a:endCxn id="138" idx="1"/>
-          </p:cNvCxnSpPr>
-          <p:nvPr/>
-        </p:nvCxnSpPr>
-        <p:spPr>
-          <a:xfrm flipH="1" rot="10800000">
-            <a:off x="5920938" y="2513725"/>
-            <a:ext cx="1568700" cy="1146900"/>
-          </a:xfrm>
-          <a:prstGeom prst="straightConnector1">
-            <a:avLst/>
-          </a:prstGeom>
-          <a:noFill/>
-          <a:ln cap="flat" cmpd="sng" w="9525">
-            <a:solidFill>
-              <a:schemeClr val="dk2"/>
-            </a:solidFill>
-            <a:prstDash val="solid"/>
-            <a:round/>
-            <a:headEnd len="med" w="med" type="none"/>
-            <a:tailEnd len="med" w="med" type="triangle"/>
-          </a:ln>
-        </p:spPr>
-      </p:cxnSp>
-      <p:cxnSp>
-        <p:nvCxnSpPr>
-          <p:cNvPr id="146" name="Google Shape;146;p18"/>
-          <p:cNvCxnSpPr>
-            <a:endCxn id="142" idx="1"/>
-          </p:cNvCxnSpPr>
-          <p:nvPr/>
-        </p:nvCxnSpPr>
-        <p:spPr>
-          <a:xfrm>
-            <a:off x="5911938" y="3660550"/>
-            <a:ext cx="1577700" cy="1149300"/>
-          </a:xfrm>
-          <a:prstGeom prst="straightConnector1">
-            <a:avLst/>
-          </a:prstGeom>
-          <a:noFill/>
-          <a:ln cap="flat" cmpd="sng" w="9525">
-            <a:solidFill>
-              <a:schemeClr val="dk2"/>
-            </a:solidFill>
-            <a:prstDash val="solid"/>
-            <a:round/>
-            <a:headEnd len="med" w="med" type="none"/>
-            <a:tailEnd len="med" w="med" type="triangle"/>
-          </a:ln>
-        </p:spPr>
-      </p:cxnSp>
-      <p:cxnSp>
-        <p:nvCxnSpPr>
-          <p:cNvPr id="147" name="Google Shape;147;p18"/>
           <p:cNvCxnSpPr/>
           <p:nvPr/>
         </p:nvCxnSpPr>
@@ -13855,6 +13819,64 @@
           </a:ln>
         </p:spPr>
       </p:cxnSp>
+      <p:sp>
+        <p:nvSpPr>
+          <p:cNvPr id="146" name="Google Shape;146;p18"/>
+          <p:cNvSpPr txBox="1"/>
+          <p:nvPr/>
+        </p:nvSpPr>
+        <p:spPr>
+          <a:xfrm>
+            <a:off x="3003650" y="2221225"/>
+            <a:ext cx="2934300" cy="585000"/>
+          </a:xfrm>
+          <a:prstGeom prst="rect">
+            <a:avLst/>
+          </a:prstGeom>
+          <a:noFill/>
+          <a:ln>
+            <a:noFill/>
+          </a:ln>
+        </p:spPr>
+        <p:txBody>
+          <a:bodyPr anchorCtr="0" anchor="t" bIns="91425" lIns="91425" spcFirstLastPara="1" rIns="91425" wrap="square" tIns="91425">
+            <a:spAutoFit/>
+          </a:bodyPr>
+          <a:lstStyle/>
+          <a:p>
+            <a:pPr indent="0" lvl="0" marL="0" rtl="0" algn="l">
+              <a:spcBef>
+                <a:spcPts val="0"/>
+              </a:spcBef>
+              <a:spcAft>
+                <a:spcPts val="0"/>
+              </a:spcAft>
+              <a:buNone/>
+            </a:pPr>
+            <a:r>
+              <a:rPr b="1" lang="es-ES" sz="2600">
+                <a:solidFill>
+                  <a:schemeClr val="lt1"/>
+                </a:solidFill>
+                <a:latin typeface="Roboto"/>
+                <a:ea typeface="Roboto"/>
+                <a:cs typeface="Roboto"/>
+                <a:sym typeface="Roboto"/>
+              </a:rPr>
+              <a:t>PLAIN TEXT</a:t>
+            </a:r>
+            <a:endParaRPr b="1" sz="2600">
+              <a:solidFill>
+                <a:schemeClr val="lt1"/>
+              </a:solidFill>
+              <a:latin typeface="Roboto"/>
+              <a:ea typeface="Roboto"/>
+              <a:cs typeface="Roboto"/>
+              <a:sym typeface="Roboto"/>
+            </a:endParaRPr>
+          </a:p>
+        </p:txBody>
+      </p:sp>
     </p:spTree>
   </p:cSld>
   <p:clrMapOvr>
@@ -13875,7 +13897,7 @@
     </p:bg>
     <p:spTree>
       <p:nvGrpSpPr>
-        <p:cNvPr id="151" name="Shape 151"/>
+        <p:cNvPr id="150" name="Shape 150"/>
         <p:cNvGrpSpPr/>
         <p:nvPr/>
       </p:nvGrpSpPr>
@@ -13889,7 +13911,7 @@
       </p:grpSpPr>
       <p:sp>
         <p:nvSpPr>
-          <p:cNvPr id="152" name="Google Shape;152;p19"/>
+          <p:cNvPr id="151" name="Google Shape;151;p19"/>
           <p:cNvSpPr txBox="1"/>
           <p:nvPr/>
         </p:nvSpPr>
@@ -13947,7 +13969,7 @@
       </p:sp>
       <p:sp>
         <p:nvSpPr>
-          <p:cNvPr id="153" name="Google Shape;153;p19"/>
+          <p:cNvPr id="152" name="Google Shape;152;p19"/>
           <p:cNvSpPr/>
           <p:nvPr/>
         </p:nvSpPr>
@@ -13996,7 +14018,7 @@
       </p:sp>
       <p:grpSp>
         <p:nvGrpSpPr>
-          <p:cNvPr id="154" name="Google Shape;154;p19"/>
+          <p:cNvPr id="153" name="Google Shape;153;p19"/>
           <p:cNvGrpSpPr/>
           <p:nvPr/>
         </p:nvGrpSpPr>
@@ -14010,7 +14032,7 @@
         </p:grpSpPr>
         <p:pic>
           <p:nvPicPr>
-            <p:cNvPr id="155" name="Google Shape;155;p19"/>
+            <p:cNvPr id="154" name="Google Shape;154;p19"/>
             <p:cNvPicPr preferRelativeResize="0"/>
             <p:nvPr/>
           </p:nvPicPr>
@@ -14037,7 +14059,7 @@
         </p:pic>
         <p:pic>
           <p:nvPicPr>
-            <p:cNvPr id="156" name="Google Shape;156;p19"/>
+            <p:cNvPr id="155" name="Google Shape;155;p19"/>
             <p:cNvPicPr preferRelativeResize="0"/>
             <p:nvPr/>
           </p:nvPicPr>
@@ -14066,7 +14088,7 @@
       </p:grpSp>
       <p:pic>
         <p:nvPicPr>
-          <p:cNvPr id="157" name="Google Shape;157;p19"/>
+          <p:cNvPr id="156" name="Google Shape;156;p19"/>
           <p:cNvPicPr preferRelativeResize="0"/>
           <p:nvPr/>
         </p:nvPicPr>
@@ -14094,7 +14116,7 @@
       </p:pic>
       <p:cxnSp>
         <p:nvCxnSpPr>
-          <p:cNvPr id="158" name="Google Shape;158;p19"/>
+          <p:cNvPr id="157" name="Google Shape;157;p19"/>
           <p:cNvCxnSpPr/>
           <p:nvPr/>
         </p:nvCxnSpPr>
@@ -14127,6 +14149,285 @@
 </file>
 
 <file path=ppt/theme/theme1.xml><?xml version="1.0" encoding="utf-8"?>
+<a:theme xmlns:a="http://schemas.openxmlformats.org/drawingml/2006/main" xmlns:r="http://schemas.openxmlformats.org/officeDocument/2006/relationships" name="Tema de Office">
+  <a:themeElements>
+    <a:clrScheme name="Personalizados 20">
+      <a:dk1>
+        <a:srgbClr val="000000"/>
+      </a:dk1>
+      <a:lt1>
+        <a:srgbClr val="FFFFFF"/>
+      </a:lt1>
+      <a:dk2>
+        <a:srgbClr val="44546A"/>
+      </a:dk2>
+      <a:lt2>
+        <a:srgbClr val="E7E6E6"/>
+      </a:lt2>
+      <a:accent1>
+        <a:srgbClr val="FFC000"/>
+      </a:accent1>
+      <a:accent2>
+        <a:srgbClr val="0D0D0D"/>
+      </a:accent2>
+      <a:accent3>
+        <a:srgbClr val="A5A5A5"/>
+      </a:accent3>
+      <a:accent4>
+        <a:srgbClr val="CECECE"/>
+      </a:accent4>
+      <a:accent5>
+        <a:srgbClr val="262626"/>
+      </a:accent5>
+      <a:accent6>
+        <a:srgbClr val="7F7F7F"/>
+      </a:accent6>
+      <a:hlink>
+        <a:srgbClr val="0563C1"/>
+      </a:hlink>
+      <a:folHlink>
+        <a:srgbClr val="954F72"/>
+      </a:folHlink>
+    </a:clrScheme>
+    <a:fontScheme name="Office">
+      <a:majorFont>
+        <a:latin typeface="Arial"/>
+        <a:ea typeface=""/>
+        <a:cs typeface=""/>
+        <a:font script="Jpan" typeface="ＭＳ Ｐゴシック"/>
+        <a:font script="Hang" typeface="맑은 고딕"/>
+        <a:font script="Hans" typeface="宋体"/>
+        <a:font script="Hant" typeface="新細明體"/>
+        <a:font script="Arab" typeface="Times New Roman"/>
+        <a:font script="Hebr" typeface="Times New Roman"/>
+        <a:font script="Thai" typeface="Angsana New"/>
+        <a:font script="Ethi" typeface="Nyala"/>
+        <a:font script="Beng" typeface="Vrinda"/>
+        <a:font script="Gujr" typeface="Shruti"/>
+        <a:font script="Khmr" typeface="MoolBoran"/>
+        <a:font script="Knda" typeface="Tunga"/>
+        <a:font script="Guru" typeface="Raavi"/>
+        <a:font script="Cans" typeface="Euphemia"/>
+        <a:font script="Cher" typeface="Plantagenet Cherokee"/>
+        <a:font script="Yiii" typeface="Microsoft Yi Baiti"/>
+        <a:font script="Tibt" typeface="Microsoft Himalaya"/>
+        <a:font script="Thaa" typeface="MV Boli"/>
+        <a:font script="Deva" typeface="Mangal"/>
+        <a:font script="Telu" typeface="Gautami"/>
+        <a:font script="Taml" typeface="Latha"/>
+        <a:font script="Syrc" typeface="Estrangelo Edessa"/>
+        <a:font script="Orya" typeface="Kalinga"/>
+        <a:font script="Mlym" typeface="Kartika"/>
+        <a:font script="Laoo" typeface="DokChampa"/>
+        <a:font script="Sinh" typeface="Iskoola Pota"/>
+        <a:font script="Mong" typeface="Mongolian Baiti"/>
+        <a:font script="Viet" typeface="Times New Roman"/>
+        <a:font script="Uigh" typeface="Microsoft Uighur"/>
+        <a:font script="Geor" typeface="Sylfaen"/>
+      </a:majorFont>
+      <a:minorFont>
+        <a:latin typeface="Arial"/>
+        <a:ea typeface=""/>
+        <a:cs typeface=""/>
+        <a:font script="Jpan" typeface="ＭＳ Ｐゴシック"/>
+        <a:font script="Hang" typeface="맑은 고딕"/>
+        <a:font script="Hans" typeface="宋体"/>
+        <a:font script="Hant" typeface="新細明體"/>
+        <a:font script="Arab" typeface="Arial"/>
+        <a:font script="Hebr" typeface="Arial"/>
+        <a:font script="Thai" typeface="Cordia New"/>
+        <a:font script="Ethi" typeface="Nyala"/>
+        <a:font script="Beng" typeface="Vrinda"/>
+        <a:font script="Gujr" typeface="Shruti"/>
+        <a:font script="Khmr" typeface="DaunPenh"/>
+        <a:font script="Knda" typeface="Tunga"/>
+        <a:font script="Guru" typeface="Raavi"/>
+        <a:font script="Cans" typeface="Euphemia"/>
+        <a:font script="Cher" typeface="Plantagenet Cherokee"/>
+        <a:font script="Yiii" typeface="Microsoft Yi Baiti"/>
+        <a:font script="Tibt" typeface="Microsoft Himalaya"/>
+        <a:font script="Thaa" typeface="MV Boli"/>
+        <a:font script="Deva" typeface="Mangal"/>
+        <a:font script="Telu" typeface="Gautami"/>
+        <a:font script="Taml" typeface="Latha"/>
+        <a:font script="Syrc" typeface="Estrangelo Edessa"/>
+        <a:font script="Orya" typeface="Kalinga"/>
+        <a:font script="Mlym" typeface="Kartika"/>
+        <a:font script="Laoo" typeface="DokChampa"/>
+        <a:font script="Sinh" typeface="Iskoola Pota"/>
+        <a:font script="Mong" typeface="Mongolian Baiti"/>
+        <a:font script="Viet" typeface="Arial"/>
+        <a:font script="Uigh" typeface="Microsoft Uighur"/>
+        <a:font script="Geor" typeface="Sylfaen"/>
+      </a:minorFont>
+    </a:fontScheme>
+    <a:fmtScheme name="Office">
+      <a:fillStyleLst>
+        <a:solidFill>
+          <a:schemeClr val="phClr"/>
+        </a:solidFill>
+        <a:gradFill rotWithShape="1">
+          <a:gsLst>
+            <a:gs pos="0">
+              <a:schemeClr val="phClr">
+                <a:tint val="50000"/>
+                <a:satMod val="300000"/>
+              </a:schemeClr>
+            </a:gs>
+            <a:gs pos="35000">
+              <a:schemeClr val="phClr">
+                <a:tint val="37000"/>
+                <a:satMod val="300000"/>
+              </a:schemeClr>
+            </a:gs>
+            <a:gs pos="100000">
+              <a:schemeClr val="phClr">
+                <a:tint val="15000"/>
+                <a:satMod val="350000"/>
+              </a:schemeClr>
+            </a:gs>
+          </a:gsLst>
+          <a:lin ang="16200000" scaled="1"/>
+        </a:gradFill>
+        <a:gradFill rotWithShape="1">
+          <a:gsLst>
+            <a:gs pos="0">
+              <a:schemeClr val="phClr">
+                <a:tint val="100000"/>
+                <a:shade val="100000"/>
+                <a:satMod val="130000"/>
+              </a:schemeClr>
+            </a:gs>
+            <a:gs pos="100000">
+              <a:schemeClr val="phClr">
+                <a:tint val="50000"/>
+                <a:shade val="100000"/>
+                <a:satMod val="350000"/>
+              </a:schemeClr>
+            </a:gs>
+          </a:gsLst>
+          <a:lin ang="16200000" scaled="0"/>
+        </a:gradFill>
+      </a:fillStyleLst>
+      <a:lnStyleLst>
+        <a:ln w="9525" cap="flat" cmpd="sng" algn="ctr">
+          <a:solidFill>
+            <a:schemeClr val="phClr">
+              <a:shade val="95000"/>
+              <a:satMod val="105000"/>
+            </a:schemeClr>
+          </a:solidFill>
+          <a:prstDash val="solid"/>
+        </a:ln>
+        <a:ln w="25400" cap="flat" cmpd="sng" algn="ctr">
+          <a:solidFill>
+            <a:schemeClr val="phClr"/>
+          </a:solidFill>
+          <a:prstDash val="solid"/>
+        </a:ln>
+        <a:ln w="38100" cap="flat" cmpd="sng" algn="ctr">
+          <a:solidFill>
+            <a:schemeClr val="phClr"/>
+          </a:solidFill>
+          <a:prstDash val="solid"/>
+        </a:ln>
+      </a:lnStyleLst>
+      <a:effectStyleLst>
+        <a:effectStyle>
+          <a:effectLst>
+            <a:outerShdw blurRad="40000" dist="20000" dir="5400000" rotWithShape="0">
+              <a:srgbClr val="000000">
+                <a:alpha val="38000"/>
+              </a:srgbClr>
+            </a:outerShdw>
+          </a:effectLst>
+        </a:effectStyle>
+        <a:effectStyle>
+          <a:effectLst>
+            <a:outerShdw blurRad="40000" dist="23000" dir="5400000" rotWithShape="0">
+              <a:srgbClr val="000000">
+                <a:alpha val="35000"/>
+              </a:srgbClr>
+            </a:outerShdw>
+          </a:effectLst>
+        </a:effectStyle>
+        <a:effectStyle>
+          <a:effectLst>
+            <a:outerShdw blurRad="40000" dist="23000" dir="5400000" rotWithShape="0">
+              <a:srgbClr val="000000">
+                <a:alpha val="35000"/>
+              </a:srgbClr>
+            </a:outerShdw>
+          </a:effectLst>
+          <a:scene3d>
+            <a:camera prst="orthographicFront">
+              <a:rot lat="0" lon="0" rev="0"/>
+            </a:camera>
+            <a:lightRig rig="threePt" dir="t">
+              <a:rot lat="0" lon="0" rev="1200000"/>
+            </a:lightRig>
+          </a:scene3d>
+          <a:sp3d>
+            <a:bevelT w="63500" h="25400"/>
+          </a:sp3d>
+        </a:effectStyle>
+      </a:effectStyleLst>
+      <a:bgFillStyleLst>
+        <a:solidFill>
+          <a:schemeClr val="phClr"/>
+        </a:solidFill>
+        <a:gradFill rotWithShape="1">
+          <a:gsLst>
+            <a:gs pos="0">
+              <a:schemeClr val="phClr">
+                <a:tint val="40000"/>
+                <a:satMod val="350000"/>
+              </a:schemeClr>
+            </a:gs>
+            <a:gs pos="40000">
+              <a:schemeClr val="phClr">
+                <a:tint val="45000"/>
+                <a:shade val="99000"/>
+                <a:satMod val="350000"/>
+              </a:schemeClr>
+            </a:gs>
+            <a:gs pos="100000">
+              <a:schemeClr val="phClr">
+                <a:shade val="20000"/>
+                <a:satMod val="255000"/>
+              </a:schemeClr>
+            </a:gs>
+          </a:gsLst>
+          <a:path path="circle">
+            <a:fillToRect l="50000" t="-80000" r="50000" b="180000"/>
+          </a:path>
+        </a:gradFill>
+        <a:gradFill rotWithShape="1">
+          <a:gsLst>
+            <a:gs pos="0">
+              <a:schemeClr val="phClr">
+                <a:tint val="80000"/>
+                <a:satMod val="300000"/>
+              </a:schemeClr>
+            </a:gs>
+            <a:gs pos="100000">
+              <a:schemeClr val="phClr">
+                <a:shade val="30000"/>
+                <a:satMod val="200000"/>
+              </a:schemeClr>
+            </a:gs>
+          </a:gsLst>
+          <a:path path="circle">
+            <a:fillToRect l="50000" t="50000" r="50000" b="50000"/>
+          </a:path>
+        </a:gradFill>
+      </a:bgFillStyleLst>
+    </a:fmtScheme>
+  </a:themeElements>
+</a:theme>
+</file>
+
+<file path=ppt/theme/theme2.xml><?xml version="1.0" encoding="utf-8"?>
 <a:theme xmlns:a="http://schemas.openxmlformats.org/drawingml/2006/main" xmlns:r="http://schemas.openxmlformats.org/officeDocument/2006/relationships">
   <a:themeElements>
     <a:clrScheme name="Default">
@@ -14403,283 +14704,4 @@
     </a:fmtScheme>
   </a:themeElements>
 </a:theme>
-</file>
-
-<file path=ppt/theme/theme2.xml><?xml version="1.0" encoding="utf-8"?>
-<a:theme xmlns:a="http://schemas.openxmlformats.org/drawingml/2006/main" xmlns:r="http://schemas.openxmlformats.org/officeDocument/2006/relationships" name="Tema de Office">
-  <a:themeElements>
-    <a:clrScheme name="Personalizados 20">
-      <a:dk1>
-        <a:srgbClr val="000000"/>
-      </a:dk1>
-      <a:lt1>
-        <a:srgbClr val="FFFFFF"/>
-      </a:lt1>
-      <a:dk2>
-        <a:srgbClr val="44546A"/>
-      </a:dk2>
-      <a:lt2>
-        <a:srgbClr val="E7E6E6"/>
-      </a:lt2>
-      <a:accent1>
-        <a:srgbClr val="FFC000"/>
-      </a:accent1>
-      <a:accent2>
-        <a:srgbClr val="0D0D0D"/>
-      </a:accent2>
-      <a:accent3>
-        <a:srgbClr val="A5A5A5"/>
-      </a:accent3>
-      <a:accent4>
-        <a:srgbClr val="CECECE"/>
-      </a:accent4>
-      <a:accent5>
-        <a:srgbClr val="262626"/>
-      </a:accent5>
-      <a:accent6>
-        <a:srgbClr val="7F7F7F"/>
-      </a:accent6>
-      <a:hlink>
-        <a:srgbClr val="0563C1"/>
-      </a:hlink>
-      <a:folHlink>
-        <a:srgbClr val="954F72"/>
-      </a:folHlink>
-    </a:clrScheme>
-    <a:fontScheme name="Office">
-      <a:majorFont>
-        <a:latin typeface="Arial"/>
-        <a:ea typeface=""/>
-        <a:cs typeface=""/>
-        <a:font script="Jpan" typeface="ＭＳ Ｐゴシック"/>
-        <a:font script="Hang" typeface="맑은 고딕"/>
-        <a:font script="Hans" typeface="宋体"/>
-        <a:font script="Hant" typeface="新細明體"/>
-        <a:font script="Arab" typeface="Times New Roman"/>
-        <a:font script="Hebr" typeface="Times New Roman"/>
-        <a:font script="Thai" typeface="Angsana New"/>
-        <a:font script="Ethi" typeface="Nyala"/>
-        <a:font script="Beng" typeface="Vrinda"/>
-        <a:font script="Gujr" typeface="Shruti"/>
-        <a:font script="Khmr" typeface="MoolBoran"/>
-        <a:font script="Knda" typeface="Tunga"/>
-        <a:font script="Guru" typeface="Raavi"/>
-        <a:font script="Cans" typeface="Euphemia"/>
-        <a:font script="Cher" typeface="Plantagenet Cherokee"/>
-        <a:font script="Yiii" typeface="Microsoft Yi Baiti"/>
-        <a:font script="Tibt" typeface="Microsoft Himalaya"/>
-        <a:font script="Thaa" typeface="MV Boli"/>
-        <a:font script="Deva" typeface="Mangal"/>
-        <a:font script="Telu" typeface="Gautami"/>
-        <a:font script="Taml" typeface="Latha"/>
-        <a:font script="Syrc" typeface="Estrangelo Edessa"/>
-        <a:font script="Orya" typeface="Kalinga"/>
-        <a:font script="Mlym" typeface="Kartika"/>
-        <a:font script="Laoo" typeface="DokChampa"/>
-        <a:font script="Sinh" typeface="Iskoola Pota"/>
-        <a:font script="Mong" typeface="Mongolian Baiti"/>
-        <a:font script="Viet" typeface="Times New Roman"/>
-        <a:font script="Uigh" typeface="Microsoft Uighur"/>
-        <a:font script="Geor" typeface="Sylfaen"/>
-      </a:majorFont>
-      <a:minorFont>
-        <a:latin typeface="Arial"/>
-        <a:ea typeface=""/>
-        <a:cs typeface=""/>
-        <a:font script="Jpan" typeface="ＭＳ Ｐゴシック"/>
-        <a:font script="Hang" typeface="맑은 고딕"/>
-        <a:font script="Hans" typeface="宋体"/>
-        <a:font script="Hant" typeface="新細明體"/>
-        <a:font script="Arab" typeface="Arial"/>
-        <a:font script="Hebr" typeface="Arial"/>
-        <a:font script="Thai" typeface="Cordia New"/>
-        <a:font script="Ethi" typeface="Nyala"/>
-        <a:font script="Beng" typeface="Vrinda"/>
-        <a:font script="Gujr" typeface="Shruti"/>
-        <a:font script="Khmr" typeface="DaunPenh"/>
-        <a:font script="Knda" typeface="Tunga"/>
-        <a:font script="Guru" typeface="Raavi"/>
-        <a:font script="Cans" typeface="Euphemia"/>
-        <a:font script="Cher" typeface="Plantagenet Cherokee"/>
-        <a:font script="Yiii" typeface="Microsoft Yi Baiti"/>
-        <a:font script="Tibt" typeface="Microsoft Himalaya"/>
-        <a:font script="Thaa" typeface="MV Boli"/>
-        <a:font script="Deva" typeface="Mangal"/>
-        <a:font script="Telu" typeface="Gautami"/>
-        <a:font script="Taml" typeface="Latha"/>
-        <a:font script="Syrc" typeface="Estrangelo Edessa"/>
-        <a:font script="Orya" typeface="Kalinga"/>
-        <a:font script="Mlym" typeface="Kartika"/>
-        <a:font script="Laoo" typeface="DokChampa"/>
-        <a:font script="Sinh" typeface="Iskoola Pota"/>
-        <a:font script="Mong" typeface="Mongolian Baiti"/>
-        <a:font script="Viet" typeface="Arial"/>
-        <a:font script="Uigh" typeface="Microsoft Uighur"/>
-        <a:font script="Geor" typeface="Sylfaen"/>
-      </a:minorFont>
-    </a:fontScheme>
-    <a:fmtScheme name="Office">
-      <a:fillStyleLst>
-        <a:solidFill>
-          <a:schemeClr val="phClr"/>
-        </a:solidFill>
-        <a:gradFill rotWithShape="1">
-          <a:gsLst>
-            <a:gs pos="0">
-              <a:schemeClr val="phClr">
-                <a:tint val="50000"/>
-                <a:satMod val="300000"/>
-              </a:schemeClr>
-            </a:gs>
-            <a:gs pos="35000">
-              <a:schemeClr val="phClr">
-                <a:tint val="37000"/>
-                <a:satMod val="300000"/>
-              </a:schemeClr>
-            </a:gs>
-            <a:gs pos="100000">
-              <a:schemeClr val="phClr">
-                <a:tint val="15000"/>
-                <a:satMod val="350000"/>
-              </a:schemeClr>
-            </a:gs>
-          </a:gsLst>
-          <a:lin ang="16200000" scaled="1"/>
-        </a:gradFill>
-        <a:gradFill rotWithShape="1">
-          <a:gsLst>
-            <a:gs pos="0">
-              <a:schemeClr val="phClr">
-                <a:tint val="100000"/>
-                <a:shade val="100000"/>
-                <a:satMod val="130000"/>
-              </a:schemeClr>
-            </a:gs>
-            <a:gs pos="100000">
-              <a:schemeClr val="phClr">
-                <a:tint val="50000"/>
-                <a:shade val="100000"/>
-                <a:satMod val="350000"/>
-              </a:schemeClr>
-            </a:gs>
-          </a:gsLst>
-          <a:lin ang="16200000" scaled="0"/>
-        </a:gradFill>
-      </a:fillStyleLst>
-      <a:lnStyleLst>
-        <a:ln w="9525" cap="flat" cmpd="sng" algn="ctr">
-          <a:solidFill>
-            <a:schemeClr val="phClr">
-              <a:shade val="95000"/>
-              <a:satMod val="105000"/>
-            </a:schemeClr>
-          </a:solidFill>
-          <a:prstDash val="solid"/>
-        </a:ln>
-        <a:ln w="25400" cap="flat" cmpd="sng" algn="ctr">
-          <a:solidFill>
-            <a:schemeClr val="phClr"/>
-          </a:solidFill>
-          <a:prstDash val="solid"/>
-        </a:ln>
-        <a:ln w="38100" cap="flat" cmpd="sng" algn="ctr">
-          <a:solidFill>
-            <a:schemeClr val="phClr"/>
-          </a:solidFill>
-          <a:prstDash val="solid"/>
-        </a:ln>
-      </a:lnStyleLst>
-      <a:effectStyleLst>
-        <a:effectStyle>
-          <a:effectLst>
-            <a:outerShdw blurRad="40000" dist="20000" dir="5400000" rotWithShape="0">
-              <a:srgbClr val="000000">
-                <a:alpha val="38000"/>
-              </a:srgbClr>
-            </a:outerShdw>
-          </a:effectLst>
-        </a:effectStyle>
-        <a:effectStyle>
-          <a:effectLst>
-            <a:outerShdw blurRad="40000" dist="23000" dir="5400000" rotWithShape="0">
-              <a:srgbClr val="000000">
-                <a:alpha val="35000"/>
-              </a:srgbClr>
-            </a:outerShdw>
-          </a:effectLst>
-        </a:effectStyle>
-        <a:effectStyle>
-          <a:effectLst>
-            <a:outerShdw blurRad="40000" dist="23000" dir="5400000" rotWithShape="0">
-              <a:srgbClr val="000000">
-                <a:alpha val="35000"/>
-              </a:srgbClr>
-            </a:outerShdw>
-          </a:effectLst>
-          <a:scene3d>
-            <a:camera prst="orthographicFront">
-              <a:rot lat="0" lon="0" rev="0"/>
-            </a:camera>
-            <a:lightRig rig="threePt" dir="t">
-              <a:rot lat="0" lon="0" rev="1200000"/>
-            </a:lightRig>
-          </a:scene3d>
-          <a:sp3d>
-            <a:bevelT w="63500" h="25400"/>
-          </a:sp3d>
-        </a:effectStyle>
-      </a:effectStyleLst>
-      <a:bgFillStyleLst>
-        <a:solidFill>
-          <a:schemeClr val="phClr"/>
-        </a:solidFill>
-        <a:gradFill rotWithShape="1">
-          <a:gsLst>
-            <a:gs pos="0">
-              <a:schemeClr val="phClr">
-                <a:tint val="40000"/>
-                <a:satMod val="350000"/>
-              </a:schemeClr>
-            </a:gs>
-            <a:gs pos="40000">
-              <a:schemeClr val="phClr">
-                <a:tint val="45000"/>
-                <a:shade val="99000"/>
-                <a:satMod val="350000"/>
-              </a:schemeClr>
-            </a:gs>
-            <a:gs pos="100000">
-              <a:schemeClr val="phClr">
-                <a:shade val="20000"/>
-                <a:satMod val="255000"/>
-              </a:schemeClr>
-            </a:gs>
-          </a:gsLst>
-          <a:path path="circle">
-            <a:fillToRect l="50000" t="-80000" r="50000" b="180000"/>
-          </a:path>
-        </a:gradFill>
-        <a:gradFill rotWithShape="1">
-          <a:gsLst>
-            <a:gs pos="0">
-              <a:schemeClr val="phClr">
-                <a:tint val="80000"/>
-                <a:satMod val="300000"/>
-              </a:schemeClr>
-            </a:gs>
-            <a:gs pos="100000">
-              <a:schemeClr val="phClr">
-                <a:shade val="30000"/>
-                <a:satMod val="200000"/>
-              </a:schemeClr>
-            </a:gs>
-          </a:gsLst>
-          <a:path path="circle">
-            <a:fillToRect l="50000" t="50000" r="50000" b="50000"/>
-          </a:path>
-        </a:gradFill>
-      </a:bgFillStyleLst>
-    </a:fmtScheme>
-  </a:themeElements>
-</a:theme>
 </file>
</xml_diff>